<commit_message>
Namen der Variablen korrgiert, vereinheitlicht, Schreibfehler.
</commit_message>
<xml_diff>
--- a/20151202/Einführung20151202.pptx
+++ b/20151202/Einführung20151202.pptx
@@ -870,7 +870,15 @@
           <a:p>
             <a:r>
               <a:rPr lang="de-DE" baseline="0" dirty="0" smtClean="0"/>
-              <a:t>In einem Ausdruck gibt es keine Nebenwirkung da die Variable den Wert erhält sobald sie deklariert wird.  In einer FP Sprache wäre </a:t>
+              <a:t>In einem Ausdruck gibt es keine Nebenwirkung da die </a:t>
+            </a:r>
+            <a:r>
+              <a:rPr lang="de-DE" baseline="0" dirty="0" smtClean="0"/>
+              <a:t>Ausdruck den </a:t>
+            </a:r>
+            <a:r>
+              <a:rPr lang="de-DE" baseline="0" dirty="0" smtClean="0"/>
+              <a:t>Wert erhält sobald sie deklariert wird.  In einer FP Sprache wäre </a:t>
             </a:r>
             <a:r>
               <a:rPr lang="de-DE" baseline="0" dirty="0" err="1" smtClean="0"/>
@@ -938,7 +946,6 @@
               <a:rPr lang="de-DE" baseline="0" dirty="0" smtClean="0"/>
               <a:t> darzustellen</a:t>
             </a:r>
-            <a:endParaRPr lang="de-DE" baseline="0" dirty="0" smtClean="0"/>
           </a:p>
           <a:p>
             <a:endParaRPr lang="de-DE" baseline="0" dirty="0" smtClean="0"/>
@@ -1088,11 +1095,7 @@
             </a:pPr>
             <a:r>
               <a:rPr lang="de-DE" dirty="0" smtClean="0"/>
-              <a:t>Keine </a:t>
-            </a:r>
-            <a:r>
-              <a:rPr lang="de-DE" dirty="0" smtClean="0"/>
-              <a:t>Variablen: (Slot im Speicher wo ich etwas pushen und poppen kann). </a:t>
+              <a:t>Keine Variablen: (Slot im Speicher wo ich etwas pushen und poppen kann). </a:t>
             </a:r>
           </a:p>
           <a:p>
@@ -1663,11 +1666,7 @@
             </a:r>
             <a:r>
               <a:rPr lang="de-DE" baseline="0" dirty="0" smtClean="0"/>
-              <a:t> davon </a:t>
-            </a:r>
-            <a:r>
-              <a:rPr lang="de-DE" baseline="0" dirty="0" smtClean="0"/>
-              <a:t>noch, bleibt jedoch hinter F# für erste da in C# die </a:t>
+              <a:t> davon noch, bleibt jedoch hinter F# für erste da in C# die </a:t>
             </a:r>
             <a:r>
               <a:rPr lang="de-DE" baseline="0" dirty="0" err="1" smtClean="0"/>
@@ -1927,22 +1926,13 @@
           <a:p>
             <a:r>
               <a:rPr lang="de-DE" dirty="0" smtClean="0"/>
-              <a:t>Typ </a:t>
-            </a:r>
+              <a:t>Typ &lt;&gt; Klasse: </a:t>
+            </a:r>
+          </a:p>
+          <a:p>
             <a:r>
               <a:rPr lang="de-DE" dirty="0" smtClean="0"/>
-              <a:t>&lt;&gt; Klasse: </a:t>
-            </a:r>
-            <a:endParaRPr lang="de-DE" dirty="0" smtClean="0"/>
-          </a:p>
-          <a:p>
-            <a:r>
-              <a:rPr lang="de-DE" dirty="0" smtClean="0"/>
-              <a:t>Kein </a:t>
-            </a:r>
-            <a:r>
-              <a:rPr lang="de-DE" dirty="0" smtClean="0"/>
-              <a:t>Verhalten,</a:t>
+              <a:t>Kein Verhalten,</a:t>
             </a:r>
             <a:r>
               <a:rPr lang="de-DE" baseline="0" dirty="0" smtClean="0"/>
@@ -1984,7 +1974,6 @@
               <a:rPr lang="de-DE" baseline="0" dirty="0" smtClean="0"/>
               <a:t>Komposition: aus klein mach groß und dann großer</a:t>
             </a:r>
-            <a:endParaRPr lang="de-DE" baseline="0" dirty="0" smtClean="0"/>
           </a:p>
           <a:p>
             <a:endParaRPr lang="de-DE" baseline="0" dirty="0" smtClean="0"/>
@@ -2076,11 +2065,7 @@
           <a:p>
             <a:r>
               <a:rPr lang="de-DE" dirty="0" smtClean="0"/>
-              <a:t>Annotation</a:t>
-            </a:r>
-            <a:r>
-              <a:rPr lang="de-DE" dirty="0" smtClean="0"/>
-              <a:t>: entweder tut der Programmierer dies oder,</a:t>
+              <a:t>Annotation: entweder tut der Programmierer dies oder,</a:t>
             </a:r>
             <a:r>
               <a:rPr lang="de-DE" baseline="0" dirty="0" smtClean="0"/>
@@ -2102,11 +2087,7 @@
             </a:r>
             <a:r>
               <a:rPr lang="de-DE" baseline="0" dirty="0" smtClean="0"/>
-              <a:t> oder gar nur die nächste Folie zeigen und diesen Text als Notiz </a:t>
-            </a:r>
-            <a:r>
-              <a:rPr lang="de-DE" baseline="0" dirty="0" smtClean="0"/>
-              <a:t>verwenden</a:t>
+              <a:t> oder gar nur die nächste Folie zeigen und diesen Text als Notiz verwenden</a:t>
             </a:r>
           </a:p>
           <a:p>
@@ -2463,8 +2444,17 @@
             </a:r>
             <a:r>
               <a:rPr lang="de-DE" baseline="0" dirty="0" smtClean="0"/>
-              <a:t> gewährleistet, hierfür gibt es Handbücher und viele Beispiele</a:t>
-            </a:r>
+              <a:t> gewährleistet, hierfür gibt es Handbücher und </a:t>
+            </a:r>
+            <a:r>
+              <a:rPr lang="de-DE" baseline="0" smtClean="0"/>
+              <a:t>viele </a:t>
+            </a:r>
+            <a:r>
+              <a:rPr lang="de-DE" baseline="0" smtClean="0"/>
+              <a:t>Beispiele.</a:t>
+            </a:r>
+            <a:endParaRPr lang="de-DE" baseline="0" dirty="0" smtClean="0"/>
           </a:p>
           <a:p>
             <a:pPr marL="0" marR="0" indent="0" algn="l" defTabSz="914400" rtl="0" eaLnBrk="1" fontAlgn="auto" latinLnBrk="0" hangingPunct="1">
@@ -2819,6 +2809,49 @@
             <a:r>
               <a:rPr lang="de-DE" baseline="0" dirty="0" smtClean="0"/>
               <a:t>Modellierer: dazu kommen wir noch mit dem DDD Beispiel</a:t>
+            </a:r>
+          </a:p>
+          <a:p>
+            <a:pPr marL="171450" marR="0" indent="-171450" algn="l" defTabSz="914400" rtl="0" eaLnBrk="1" fontAlgn="auto" latinLnBrk="0" hangingPunct="1">
+              <a:lnSpc>
+                <a:spcPct val="100000"/>
+              </a:lnSpc>
+              <a:spcBef>
+                <a:spcPts val="0"/>
+              </a:spcBef>
+              <a:spcAft>
+                <a:spcPts val="0"/>
+              </a:spcAft>
+              <a:buClrTx/>
+              <a:buSzTx/>
+              <a:buFontTx/>
+              <a:buChar char="-"/>
+              <a:tabLst/>
+              <a:defRPr/>
+            </a:pPr>
+            <a:endParaRPr lang="de-DE" baseline="0" dirty="0" smtClean="0"/>
+          </a:p>
+          <a:p>
+            <a:pPr marL="0" marR="0" indent="0" algn="l" defTabSz="914400" rtl="0" eaLnBrk="1" fontAlgn="auto" latinLnBrk="0" hangingPunct="1">
+              <a:lnSpc>
+                <a:spcPct val="100000"/>
+              </a:lnSpc>
+              <a:spcBef>
+                <a:spcPts val="0"/>
+              </a:spcBef>
+              <a:spcAft>
+                <a:spcPts val="0"/>
+              </a:spcAft>
+              <a:buClrTx/>
+              <a:buSzTx/>
+              <a:buFontTx/>
+              <a:buNone/>
+              <a:tabLst/>
+              <a:defRPr/>
+            </a:pPr>
+            <a:r>
+              <a:rPr lang="de-DE" baseline="0" dirty="0" smtClean="0"/>
+              <a:t>Visual Studio Unterstützung, F# Powertools</a:t>
             </a:r>
             <a:endParaRPr lang="de-DE" dirty="0" smtClean="0"/>
           </a:p>
@@ -3119,11 +3152,7 @@
             </a:r>
             <a:r>
               <a:rPr lang="de-DE" baseline="0" dirty="0" smtClean="0"/>
-              <a:t> geht nicht nur um die Sprache sondern auch darum wie eine </a:t>
-            </a:r>
-            <a:r>
-              <a:rPr lang="de-DE" baseline="0" smtClean="0"/>
-              <a:t>Sprache entsteht.</a:t>
+              <a:t> geht nicht nur um die Sprache sondern auch darum wie eine Sprache entsteht.</a:t>
             </a:r>
             <a:endParaRPr lang="de-DE" dirty="0" smtClean="0"/>
           </a:p>
@@ -3776,7 +3805,32 @@
             </a:r>
             <a:r>
               <a:rPr lang="de-DE" baseline="0" dirty="0" smtClean="0"/>
-              <a:t> in C# zu implementieren.</a:t>
+              <a:t> in C# zu implementieren</a:t>
+            </a:r>
+            <a:r>
+              <a:rPr lang="de-DE" baseline="0" dirty="0" smtClean="0"/>
+              <a:t>.</a:t>
+            </a:r>
+          </a:p>
+          <a:p>
+            <a:endParaRPr lang="de-DE" baseline="0" dirty="0" smtClean="0"/>
+          </a:p>
+          <a:p>
+            <a:r>
+              <a:rPr lang="de-DE" baseline="0" dirty="0" smtClean="0"/>
+              <a:t>Catch </a:t>
+            </a:r>
+            <a:r>
+              <a:rPr lang="de-DE" baseline="0" dirty="0" err="1" smtClean="0"/>
+              <a:t>when</a:t>
+            </a:r>
+            <a:r>
+              <a:rPr lang="de-DE" baseline="0" dirty="0" smtClean="0"/>
+              <a:t> in C# 6.0 ist auch in Pattern </a:t>
+            </a:r>
+            <a:r>
+              <a:rPr lang="de-DE" baseline="0" dirty="0" err="1" smtClean="0"/>
+              <a:t>Matching</a:t>
             </a:r>
             <a:endParaRPr lang="de-DE" dirty="0" smtClean="0"/>
           </a:p>
@@ -4005,19 +4059,11 @@
           <a:p>
             <a:r>
               <a:rPr lang="de-DE" dirty="0" smtClean="0"/>
-              <a:t>Zwei </a:t>
-            </a:r>
-            <a:r>
-              <a:rPr lang="de-DE" dirty="0" smtClean="0"/>
-              <a:t>im</a:t>
+              <a:t>Zwei im</a:t>
             </a:r>
             <a:r>
               <a:rPr lang="de-DE" baseline="0" dirty="0" smtClean="0"/>
-              <a:t> Sinne des Domains gleichwertige Instanzen „Kunde 123“ sind nicht identisch</a:t>
-            </a:r>
-            <a:r>
-              <a:rPr lang="de-DE" baseline="0" dirty="0" smtClean="0"/>
-              <a:t>.</a:t>
+              <a:t> Sinne des Domains gleichwertige Instanzen „Kunde 123“ sind nicht identisch.</a:t>
             </a:r>
           </a:p>
           <a:p>
@@ -4060,11 +4106,7 @@
           <a:p>
             <a:r>
               <a:rPr lang="de-DE" baseline="0" dirty="0" smtClean="0"/>
-              <a:t>Wie ist es in der einen oder in der anderen implementiert/nicht </a:t>
-            </a:r>
-            <a:r>
-              <a:rPr lang="de-DE" baseline="0" dirty="0" smtClean="0"/>
-              <a:t>implementiert</a:t>
+              <a:t>Wie ist es in der einen oder in der anderen implementiert/nicht implementiert</a:t>
             </a:r>
           </a:p>
           <a:p>
@@ -4634,7 +4676,6 @@
               <a:rPr lang="de-DE" baseline="0" dirty="0" smtClean="0"/>
               <a:t>Lambdas -&gt; anonyme Funktionen</a:t>
             </a:r>
-            <a:endParaRPr lang="de-DE" baseline="0" dirty="0" smtClean="0"/>
           </a:p>
           <a:p>
             <a:pPr marL="171450" indent="-171450">
@@ -5414,18 +5455,7 @@
                 <a:ea typeface="+mn-ea"/>
                 <a:cs typeface="+mn-cs"/>
               </a:rPr>
-              <a:t>type </a:t>
-            </a:r>
-            <a:r>
-              <a:rPr lang="en-US" sz="1200" kern="1200" dirty="0" smtClean="0">
-                <a:solidFill>
-                  <a:schemeClr val="tx1"/>
-                </a:solidFill>
-                <a:latin typeface="+mn-lt"/>
-                <a:ea typeface="+mn-ea"/>
-                <a:cs typeface="+mn-cs"/>
-              </a:rPr>
-              <a:t>S = { Name : string; </a:t>
+              <a:t>type S = { Name : string; </a:t>
             </a:r>
             <a:r>
               <a:rPr lang="en-US" sz="1200" kern="1200" dirty="0" err="1" smtClean="0">
@@ -5531,15 +5561,7 @@
             </a:pPr>
             <a:r>
               <a:rPr lang="de-DE" baseline="0" dirty="0" smtClean="0"/>
-              <a:t>Eine </a:t>
-            </a:r>
-            <a:r>
-              <a:rPr lang="de-DE" baseline="0" dirty="0" smtClean="0"/>
-              <a:t>Funktion wird zu einem Ausdruck gebunden und gibt diesem einen Wert</a:t>
-            </a:r>
-            <a:r>
-              <a:rPr lang="de-DE" baseline="0" dirty="0" smtClean="0"/>
-              <a:t>.  Diesen Wert kann ich dann auch als </a:t>
+              <a:t>Eine Funktion wird zu einem Ausdruck gebunden und gibt diesem einen Wert.  Diesen Wert kann ich dann auch als </a:t>
             </a:r>
             <a:r>
               <a:rPr lang="de-DE" baseline="0" dirty="0" err="1" smtClean="0"/>
@@ -5583,7 +5605,6 @@
               <a:rPr lang="de-DE" baseline="0" dirty="0" smtClean="0"/>
               <a:t>Die höhere Kunst ist es in der Sprache Funktionen mit Nebenwirkung so zu gestalten dass diese Nebenwirkung nicht zum Vorschein kommt, sondern dass die Funktion sich so verhält als wäre diese pure. Das heißt dass Domain und Range soweit es geht wohl definiert bleiben.</a:t>
             </a:r>
-            <a:endParaRPr lang="de-DE" baseline="0" dirty="0" smtClean="0"/>
           </a:p>
           <a:p>
             <a:endParaRPr lang="de-DE" baseline="0" dirty="0" smtClean="0"/>
@@ -9074,13 +9095,8 @@
           <a:p>
             <a:r>
               <a:rPr lang="de-DE" dirty="0" smtClean="0"/>
-              <a:t>Können als Ergebnis einer Funktionen zurückgegeben </a:t>
-            </a:r>
-            <a:r>
-              <a:rPr lang="de-DE" dirty="0" smtClean="0"/>
-              <a:t>werden</a:t>
-            </a:r>
-            <a:endParaRPr lang="de-DE" dirty="0" smtClean="0"/>
+              <a:t>Können als Ergebnis einer Funktionen zurückgegeben werden</a:t>
+            </a:r>
           </a:p>
         </p:txBody>
       </p:sp>
@@ -11089,11 +11105,7 @@
             </a:pPr>
             <a:r>
               <a:rPr lang="de-DE" dirty="0" smtClean="0"/>
-              <a:t>FP </a:t>
-            </a:r>
-            <a:r>
-              <a:rPr lang="de-DE" dirty="0" smtClean="0"/>
-              <a:t>Datentyp (ADT) </a:t>
+              <a:t>FP Datentyp (ADT) </a:t>
             </a:r>
             <a:r>
               <a:rPr lang="de-DE" dirty="0"/>
@@ -12914,6 +12926,13 @@
             </a:r>
           </a:p>
           <a:p>
+            <a:r>
+              <a:rPr lang="de-DE" dirty="0" err="1" smtClean="0"/>
+              <a:t>Tooling</a:t>
+            </a:r>
+            <a:endParaRPr lang="de-DE" dirty="0" smtClean="0"/>
+          </a:p>
+          <a:p>
             <a:pPr marL="0" indent="0">
               <a:buNone/>
             </a:pPr>
@@ -13182,6 +13201,55 @@
                                           <p:spTgt spid="3">
                                             <p:txEl>
                                               <p:pRg st="4" end="4"/>
+                                            </p:txEl>
+                                          </p:spTgt>
+                                        </p:tgtEl>
+                                        <p:attrNameLst>
+                                          <p:attrName>style.visibility</p:attrName>
+                                        </p:attrNameLst>
+                                      </p:cBhvr>
+                                      <p:to>
+                                        <p:strVal val="visible"/>
+                                      </p:to>
+                                    </p:set>
+                                  </p:childTnLst>
+                                </p:cTn>
+                              </p:par>
+                            </p:childTnLst>
+                          </p:cTn>
+                        </p:par>
+                      </p:childTnLst>
+                    </p:cTn>
+                  </p:par>
+                  <p:par>
+                    <p:cTn id="23" fill="hold">
+                      <p:stCondLst>
+                        <p:cond delay="indefinite"/>
+                      </p:stCondLst>
+                      <p:childTnLst>
+                        <p:par>
+                          <p:cTn id="24" fill="hold">
+                            <p:stCondLst>
+                              <p:cond delay="0"/>
+                            </p:stCondLst>
+                            <p:childTnLst>
+                              <p:par>
+                                <p:cTn id="25" presetID="1" presetClass="entr" presetSubtype="0" fill="hold" grpId="0" nodeType="clickEffect">
+                                  <p:stCondLst>
+                                    <p:cond delay="0"/>
+                                  </p:stCondLst>
+                                  <p:childTnLst>
+                                    <p:set>
+                                      <p:cBhvr>
+                                        <p:cTn id="26" dur="1" fill="hold">
+                                          <p:stCondLst>
+                                            <p:cond delay="0"/>
+                                          </p:stCondLst>
+                                        </p:cTn>
+                                        <p:tgtEl>
+                                          <p:spTgt spid="3">
+                                            <p:txEl>
+                                              <p:pRg st="5" end="5"/>
                                             </p:txEl>
                                           </p:spTgt>
                                         </p:tgtEl>
@@ -15598,6 +15666,11 @@
             <a:avLst/>
           </a:prstGeom>
           <a:noFill/>
+          <a:ln>
+            <a:solidFill>
+              <a:schemeClr val="accent1"/>
+            </a:solidFill>
+          </a:ln>
         </p:spPr>
         <p:txBody>
           <a:bodyPr wrap="none" rtlCol="0">
@@ -16141,7 +16214,7 @@
       </p:par>
     </p:tnLst>
     <p:bldLst>
-      <p:bldP spid="4" grpId="0"/>
+      <p:bldP spid="4" grpId="0" animBg="1"/>
       <p:bldP spid="5" grpId="0"/>
       <p:bldP spid="6" grpId="0"/>
       <p:bldP spid="7" grpId="0"/>
@@ -17057,7 +17130,6 @@
               <a:rPr lang="en-US" dirty="0"/>
               <a:t>"U.S. Army Photo"</a:t>
             </a:r>
-            <a:endParaRPr lang="en-US" dirty="0"/>
           </a:p>
         </p:txBody>
       </p:sp>
@@ -18633,11 +18705,7 @@
           <a:p>
             <a:r>
               <a:rPr lang="de-DE" dirty="0" smtClean="0"/>
-              <a:t>Was ist </a:t>
-            </a:r>
-            <a:r>
-              <a:rPr lang="de-DE" dirty="0" smtClean="0"/>
-              <a:t>FP?*</a:t>
+              <a:t>Was ist FP?*</a:t>
             </a:r>
             <a:endParaRPr lang="en-US" dirty="0"/>
           </a:p>

</xml_diff>